<commit_message>
move gnss to libraries section, fix state machine graph.
</commit_message>
<xml_diff>
--- a/ApplicationDeveloperGuide/images/gnss-state-machine.pptx
+++ b/ApplicationDeveloperGuide/images/gnss-state-machine.pptx
@@ -5,7 +5,7 @@
     <p:sldMasterId id="2147483648" r:id="rId1"/>
   </p:sldMasterIdLst>
   <p:sldIdLst>
-    <p:sldId id="259" r:id="rId2"/>
+    <p:sldId id="260" r:id="rId2"/>
   </p:sldIdLst>
   <p:sldSz cx="12192000" cy="6858000"/>
   <p:notesSz cx="6858000" cy="9144000"/>
@@ -261,7 +261,7 @@
           <a:p>
             <a:fld id="{7099DA68-A5A9-49AF-ACB5-907080CB2568}" type="datetimeFigureOut">
               <a:rPr lang="en-GB" smtClean="0"/>
-              <a:t>30/08/2023</a:t>
+              <a:t>18/06/2025</a:t>
             </a:fld>
             <a:endParaRPr lang="en-GB"/>
           </a:p>
@@ -461,7 +461,7 @@
           <a:p>
             <a:fld id="{7099DA68-A5A9-49AF-ACB5-907080CB2568}" type="datetimeFigureOut">
               <a:rPr lang="en-GB" smtClean="0"/>
-              <a:t>30/08/2023</a:t>
+              <a:t>18/06/2025</a:t>
             </a:fld>
             <a:endParaRPr lang="en-GB"/>
           </a:p>
@@ -671,7 +671,7 @@
           <a:p>
             <a:fld id="{7099DA68-A5A9-49AF-ACB5-907080CB2568}" type="datetimeFigureOut">
               <a:rPr lang="en-GB" smtClean="0"/>
-              <a:t>30/08/2023</a:t>
+              <a:t>18/06/2025</a:t>
             </a:fld>
             <a:endParaRPr lang="en-GB"/>
           </a:p>
@@ -871,7 +871,7 @@
           <a:p>
             <a:fld id="{7099DA68-A5A9-49AF-ACB5-907080CB2568}" type="datetimeFigureOut">
               <a:rPr lang="en-GB" smtClean="0"/>
-              <a:t>30/08/2023</a:t>
+              <a:t>18/06/2025</a:t>
             </a:fld>
             <a:endParaRPr lang="en-GB"/>
           </a:p>
@@ -1147,7 +1147,7 @@
           <a:p>
             <a:fld id="{7099DA68-A5A9-49AF-ACB5-907080CB2568}" type="datetimeFigureOut">
               <a:rPr lang="en-GB" smtClean="0"/>
-              <a:t>30/08/2023</a:t>
+              <a:t>18/06/2025</a:t>
             </a:fld>
             <a:endParaRPr lang="en-GB"/>
           </a:p>
@@ -1415,7 +1415,7 @@
           <a:p>
             <a:fld id="{7099DA68-A5A9-49AF-ACB5-907080CB2568}" type="datetimeFigureOut">
               <a:rPr lang="en-GB" smtClean="0"/>
-              <a:t>30/08/2023</a:t>
+              <a:t>18/06/2025</a:t>
             </a:fld>
             <a:endParaRPr lang="en-GB"/>
           </a:p>
@@ -1830,7 +1830,7 @@
           <a:p>
             <a:fld id="{7099DA68-A5A9-49AF-ACB5-907080CB2568}" type="datetimeFigureOut">
               <a:rPr lang="en-GB" smtClean="0"/>
-              <a:t>30/08/2023</a:t>
+              <a:t>18/06/2025</a:t>
             </a:fld>
             <a:endParaRPr lang="en-GB"/>
           </a:p>
@@ -1972,7 +1972,7 @@
           <a:p>
             <a:fld id="{7099DA68-A5A9-49AF-ACB5-907080CB2568}" type="datetimeFigureOut">
               <a:rPr lang="en-GB" smtClean="0"/>
-              <a:t>30/08/2023</a:t>
+              <a:t>18/06/2025</a:t>
             </a:fld>
             <a:endParaRPr lang="en-GB"/>
           </a:p>
@@ -2085,7 +2085,7 @@
           <a:p>
             <a:fld id="{7099DA68-A5A9-49AF-ACB5-907080CB2568}" type="datetimeFigureOut">
               <a:rPr lang="en-GB" smtClean="0"/>
-              <a:t>30/08/2023</a:t>
+              <a:t>18/06/2025</a:t>
             </a:fld>
             <a:endParaRPr lang="en-GB"/>
           </a:p>
@@ -2398,7 +2398,7 @@
           <a:p>
             <a:fld id="{7099DA68-A5A9-49AF-ACB5-907080CB2568}" type="datetimeFigureOut">
               <a:rPr lang="en-GB" smtClean="0"/>
-              <a:t>30/08/2023</a:t>
+              <a:t>18/06/2025</a:t>
             </a:fld>
             <a:endParaRPr lang="en-GB"/>
           </a:p>
@@ -2687,7 +2687,7 @@
           <a:p>
             <a:fld id="{7099DA68-A5A9-49AF-ACB5-907080CB2568}" type="datetimeFigureOut">
               <a:rPr lang="en-GB" smtClean="0"/>
-              <a:t>30/08/2023</a:t>
+              <a:t>18/06/2025</a:t>
             </a:fld>
             <a:endParaRPr lang="en-GB"/>
           </a:p>
@@ -2930,7 +2930,7 @@
           <a:p>
             <a:fld id="{7099DA68-A5A9-49AF-ACB5-907080CB2568}" type="datetimeFigureOut">
               <a:rPr lang="en-GB" smtClean="0"/>
-              <a:t>30/08/2023</a:t>
+              <a:t>18/06/2025</a:t>
             </a:fld>
             <a:endParaRPr lang="en-GB"/>
           </a:p>
@@ -3335,7 +3335,13 @@
   <p:cSld>
     <p:spTree>
       <p:nvGrpSpPr>
-        <p:cNvPr id="1" name=""/>
+        <p:cNvPr id="1" name="">
+          <a:extLst>
+            <a:ext uri="{FF2B5EF4-FFF2-40B4-BE49-F238E27FC236}">
+              <a16:creationId xmlns:a16="http://schemas.microsoft.com/office/drawing/2014/main" id="{9B9CB0B4-41C0-CD35-256B-48E07BD6BD84}"/>
+            </a:ext>
+          </a:extLst>
+        </p:cNvPr>
         <p:cNvGrpSpPr/>
         <p:nvPr/>
       </p:nvGrpSpPr>
@@ -3352,7 +3358,7 @@
           <p:cNvPr id="19" name="Rounded Rectangle 62">
             <a:extLst>
               <a:ext uri="{FF2B5EF4-FFF2-40B4-BE49-F238E27FC236}">
-                <a16:creationId xmlns:a16="http://schemas.microsoft.com/office/drawing/2014/main" id="{C0EE68CE-09C9-434A-AAE1-32D3F13E3D8F}"/>
+                <a16:creationId xmlns:a16="http://schemas.microsoft.com/office/drawing/2014/main" id="{2C6A2D9E-FFB5-1889-A301-E75828F4460C}"/>
               </a:ext>
             </a:extLst>
           </p:cNvPr>
@@ -3414,7 +3420,7 @@
           <p:cNvPr id="11" name="Rounded Rectangle 62">
             <a:extLst>
               <a:ext uri="{FF2B5EF4-FFF2-40B4-BE49-F238E27FC236}">
-                <a16:creationId xmlns:a16="http://schemas.microsoft.com/office/drawing/2014/main" id="{E4D34965-2908-48EE-BC62-BC8AAB17D09A}"/>
+                <a16:creationId xmlns:a16="http://schemas.microsoft.com/office/drawing/2014/main" id="{51E08B6F-43FB-9174-0E3B-ECE0F36684F2}"/>
               </a:ext>
             </a:extLst>
           </p:cNvPr>
@@ -3476,7 +3482,7 @@
           <p:cNvPr id="4" name="Rounded Rectangle 107">
             <a:extLst>
               <a:ext uri="{FF2B5EF4-FFF2-40B4-BE49-F238E27FC236}">
-                <a16:creationId xmlns:a16="http://schemas.microsoft.com/office/drawing/2014/main" id="{F84D17E3-A866-4FA4-A059-5BE89DD4E02F}"/>
+                <a16:creationId xmlns:a16="http://schemas.microsoft.com/office/drawing/2014/main" id="{853B012E-B007-8712-78E0-322E90024E52}"/>
               </a:ext>
             </a:extLst>
           </p:cNvPr>
@@ -3552,7 +3558,7 @@
           <p:cNvPr id="21" name="Rounded Rectangle 62">
             <a:extLst>
               <a:ext uri="{FF2B5EF4-FFF2-40B4-BE49-F238E27FC236}">
-                <a16:creationId xmlns:a16="http://schemas.microsoft.com/office/drawing/2014/main" id="{3D2C9F0B-5BE8-4AB4-B759-3924CAA64531}"/>
+                <a16:creationId xmlns:a16="http://schemas.microsoft.com/office/drawing/2014/main" id="{4C650F4C-184F-890E-2324-13A4B3268D7A}"/>
               </a:ext>
             </a:extLst>
           </p:cNvPr>
@@ -3614,7 +3620,7 @@
           <p:cNvPr id="22" name="Rounded Rectangle 107">
             <a:extLst>
               <a:ext uri="{FF2B5EF4-FFF2-40B4-BE49-F238E27FC236}">
-                <a16:creationId xmlns:a16="http://schemas.microsoft.com/office/drawing/2014/main" id="{E238BEF3-45F6-49B6-B400-3B89E389DE78}"/>
+                <a16:creationId xmlns:a16="http://schemas.microsoft.com/office/drawing/2014/main" id="{57EE24A9-F523-7178-09BE-8AA4D5E5860C}"/>
               </a:ext>
             </a:extLst>
           </p:cNvPr>
@@ -3687,10 +3693,187 @@
       </p:sp>
       <p:sp>
         <p:nvSpPr>
-          <p:cNvPr id="33" name="Rounded Rectangle 107">
-            <a:extLst>
-              <a:ext uri="{FF2B5EF4-FFF2-40B4-BE49-F238E27FC236}">
-                <a16:creationId xmlns:a16="http://schemas.microsoft.com/office/drawing/2014/main" id="{CC58F30B-B860-4909-8D3B-66FFCA29237C}"/>
+          <p:cNvPr id="124" name="TextBox 123">
+            <a:extLst>
+              <a:ext uri="{FF2B5EF4-FFF2-40B4-BE49-F238E27FC236}">
+                <a16:creationId xmlns:a16="http://schemas.microsoft.com/office/drawing/2014/main" id="{7FDC61E3-C88B-AB1F-349B-8650C23BE48D}"/>
+              </a:ext>
+            </a:extLst>
+          </p:cNvPr>
+          <p:cNvSpPr txBox="1"/>
+          <p:nvPr/>
+        </p:nvSpPr>
+        <p:spPr>
+          <a:xfrm>
+            <a:off x="7563604" y="670286"/>
+            <a:ext cx="1503607" cy="276999"/>
+          </a:xfrm>
+          <a:prstGeom prst="rect">
+            <a:avLst/>
+          </a:prstGeom>
+          <a:noFill/>
+        </p:spPr>
+        <p:txBody>
+          <a:bodyPr wrap="square" lIns="108000" rIns="108000" rtlCol="0">
+            <a:spAutoFit/>
+          </a:bodyPr>
+          <a:lstStyle/>
+          <a:p>
+            <a:pPr marL="0" marR="0" lvl="0" indent="0" algn="ctr" defTabSz="914377" eaLnBrk="1" fontAlgn="auto" latinLnBrk="0" hangingPunct="1">
+              <a:lnSpc>
+                <a:spcPct val="100000"/>
+              </a:lnSpc>
+              <a:spcBef>
+                <a:spcPts val="0"/>
+              </a:spcBef>
+              <a:spcAft>
+                <a:spcPts val="0"/>
+              </a:spcAft>
+              <a:buClrTx/>
+              <a:buSzTx/>
+              <a:buFontTx/>
+              <a:buNone/>
+              <a:tabLst/>
+              <a:defRPr/>
+            </a:pPr>
+            <a:r>
+              <a:rPr lang="en-US" sz="1200" b="1" kern="0" dirty="0">
+                <a:solidFill>
+                  <a:srgbClr val="4B5357"/>
+                </a:solidFill>
+                <a:latin typeface="Source Sans Pro Light" charset="0"/>
+                <a:ea typeface="Source Sans Pro Light" charset="0"/>
+                <a:cs typeface="Source Sans Pro Light" charset="0"/>
+              </a:rPr>
+              <a:t>STARTED</a:t>
+            </a:r>
+          </a:p>
+        </p:txBody>
+      </p:sp>
+      <p:sp>
+        <p:nvSpPr>
+          <p:cNvPr id="125" name="TextBox 124">
+            <a:extLst>
+              <a:ext uri="{FF2B5EF4-FFF2-40B4-BE49-F238E27FC236}">
+                <a16:creationId xmlns:a16="http://schemas.microsoft.com/office/drawing/2014/main" id="{6B8B9602-25EF-2FD6-D28B-49D81E1168E6}"/>
+              </a:ext>
+            </a:extLst>
+          </p:cNvPr>
+          <p:cNvSpPr txBox="1"/>
+          <p:nvPr/>
+        </p:nvSpPr>
+        <p:spPr>
+          <a:xfrm>
+            <a:off x="4441171" y="670286"/>
+            <a:ext cx="1503613" cy="276999"/>
+          </a:xfrm>
+          <a:prstGeom prst="rect">
+            <a:avLst/>
+          </a:prstGeom>
+          <a:noFill/>
+        </p:spPr>
+        <p:txBody>
+          <a:bodyPr wrap="square" lIns="108000" rIns="108000" rtlCol="0">
+            <a:spAutoFit/>
+          </a:bodyPr>
+          <a:lstStyle/>
+          <a:p>
+            <a:pPr marL="0" marR="0" lvl="0" indent="0" algn="ctr" defTabSz="914377" eaLnBrk="1" fontAlgn="auto" latinLnBrk="0" hangingPunct="1">
+              <a:lnSpc>
+                <a:spcPct val="100000"/>
+              </a:lnSpc>
+              <a:spcBef>
+                <a:spcPts val="0"/>
+              </a:spcBef>
+              <a:spcAft>
+                <a:spcPts val="0"/>
+              </a:spcAft>
+              <a:buClrTx/>
+              <a:buSzTx/>
+              <a:buFontTx/>
+              <a:buNone/>
+              <a:tabLst/>
+              <a:defRPr/>
+            </a:pPr>
+            <a:r>
+              <a:rPr lang="en-US" sz="1200" b="1" kern="0" dirty="0">
+                <a:solidFill>
+                  <a:srgbClr val="4B5357"/>
+                </a:solidFill>
+                <a:latin typeface="Source Sans Pro Light" charset="0"/>
+                <a:ea typeface="Source Sans Pro Light" charset="0"/>
+                <a:cs typeface="Source Sans Pro Light" charset="0"/>
+              </a:rPr>
+              <a:t>INITIALIZED</a:t>
+            </a:r>
+          </a:p>
+        </p:txBody>
+      </p:sp>
+      <p:sp>
+        <p:nvSpPr>
+          <p:cNvPr id="127" name="TextBox 126">
+            <a:extLst>
+              <a:ext uri="{FF2B5EF4-FFF2-40B4-BE49-F238E27FC236}">
+                <a16:creationId xmlns:a16="http://schemas.microsoft.com/office/drawing/2014/main" id="{3DBE0C33-1AFE-B4BB-07EE-756A40BF94E0}"/>
+              </a:ext>
+            </a:extLst>
+          </p:cNvPr>
+          <p:cNvSpPr txBox="1"/>
+          <p:nvPr/>
+        </p:nvSpPr>
+        <p:spPr>
+          <a:xfrm>
+            <a:off x="1286373" y="670286"/>
+            <a:ext cx="1503607" cy="276999"/>
+          </a:xfrm>
+          <a:prstGeom prst="rect">
+            <a:avLst/>
+          </a:prstGeom>
+          <a:noFill/>
+        </p:spPr>
+        <p:txBody>
+          <a:bodyPr wrap="square" lIns="108000" rIns="108000" rtlCol="0">
+            <a:spAutoFit/>
+          </a:bodyPr>
+          <a:lstStyle/>
+          <a:p>
+            <a:pPr marL="0" marR="0" lvl="0" indent="0" algn="ctr" defTabSz="914377" eaLnBrk="1" fontAlgn="auto" latinLnBrk="0" hangingPunct="1">
+              <a:lnSpc>
+                <a:spcPct val="100000"/>
+              </a:lnSpc>
+              <a:spcBef>
+                <a:spcPts val="0"/>
+              </a:spcBef>
+              <a:spcAft>
+                <a:spcPts val="0"/>
+              </a:spcAft>
+              <a:buClrTx/>
+              <a:buSzTx/>
+              <a:buFontTx/>
+              <a:buNone/>
+              <a:tabLst/>
+              <a:defRPr/>
+            </a:pPr>
+            <a:r>
+              <a:rPr lang="en-US" sz="1200" b="1" kern="0" dirty="0">
+                <a:solidFill>
+                  <a:srgbClr val="4B5357"/>
+                </a:solidFill>
+                <a:latin typeface="Source Sans Pro Light" charset="0"/>
+                <a:ea typeface="Source Sans Pro Light" charset="0"/>
+                <a:cs typeface="Source Sans Pro Light" charset="0"/>
+              </a:rPr>
+              <a:t>CLOSED</a:t>
+            </a:r>
+          </a:p>
+        </p:txBody>
+      </p:sp>
+      <p:sp>
+        <p:nvSpPr>
+          <p:cNvPr id="3" name="Rounded Rectangle 107">
+            <a:extLst>
+              <a:ext uri="{FF2B5EF4-FFF2-40B4-BE49-F238E27FC236}">
+                <a16:creationId xmlns:a16="http://schemas.microsoft.com/office/drawing/2014/main" id="{C07447B7-B892-90F2-48D0-D4BA658AA9C7}"/>
               </a:ext>
             </a:extLst>
           </p:cNvPr>
@@ -3699,8 +3882,251 @@
         </p:nvSpPr>
         <p:spPr>
           <a:xfrm>
-            <a:off x="4441188" y="3795022"/>
-            <a:ext cx="1503596" cy="615464"/>
+            <a:off x="7563603" y="1052945"/>
+            <a:ext cx="1503607" cy="1207783"/>
+          </a:xfrm>
+          <a:prstGeom prst="roundRect">
+            <a:avLst>
+              <a:gd name="adj" fmla="val 19644"/>
+            </a:avLst>
+          </a:prstGeom>
+          <a:solidFill>
+            <a:srgbClr val="717D83">
+              <a:lumMod val="60000"/>
+              <a:lumOff val="40000"/>
+            </a:srgbClr>
+          </a:solidFill>
+          <a:ln w="12700" cap="flat" cmpd="sng" algn="ctr">
+            <a:noFill/>
+            <a:prstDash val="solid"/>
+          </a:ln>
+          <a:effectLst/>
+        </p:spPr>
+        <p:txBody>
+          <a:bodyPr wrap="square" tIns="36000" bIns="36000" rtlCol="0" anchor="ctr">
+            <a:noAutofit/>
+          </a:bodyPr>
+          <a:lstStyle/>
+          <a:p>
+            <a:pPr algn="ctr" defTabSz="914377"/>
+            <a:r>
+              <a:rPr lang="en-US" sz="1100" b="1" kern="0" dirty="0">
+                <a:solidFill>
+                  <a:srgbClr val="FFFFFF"/>
+                </a:solidFill>
+                <a:latin typeface="Source Sans Pro Light" charset="0"/>
+                <a:ea typeface="Source Sans Pro Light" charset="0"/>
+              </a:rPr>
+              <a:t>Underlying GNSS engine is ON, reading of new GNSS data is possible.</a:t>
+            </a:r>
+          </a:p>
+        </p:txBody>
+      </p:sp>
+      <p:sp>
+        <p:nvSpPr>
+          <p:cNvPr id="5" name="Rounded Rectangle 107">
+            <a:extLst>
+              <a:ext uri="{FF2B5EF4-FFF2-40B4-BE49-F238E27FC236}">
+                <a16:creationId xmlns:a16="http://schemas.microsoft.com/office/drawing/2014/main" id="{42F0F50F-E84D-12EF-D702-B46172C837CF}"/>
+              </a:ext>
+            </a:extLst>
+          </p:cNvPr>
+          <p:cNvSpPr/>
+          <p:nvPr/>
+        </p:nvSpPr>
+        <p:spPr>
+          <a:xfrm>
+            <a:off x="1286373" y="1052944"/>
+            <a:ext cx="1503609" cy="1195553"/>
+          </a:xfrm>
+          <a:prstGeom prst="roundRect">
+            <a:avLst>
+              <a:gd name="adj" fmla="val 19644"/>
+            </a:avLst>
+          </a:prstGeom>
+          <a:solidFill>
+            <a:srgbClr val="717D83">
+              <a:lumMod val="60000"/>
+              <a:lumOff val="40000"/>
+            </a:srgbClr>
+          </a:solidFill>
+          <a:ln w="12700" cap="flat" cmpd="sng" algn="ctr">
+            <a:noFill/>
+            <a:prstDash val="solid"/>
+          </a:ln>
+          <a:effectLst/>
+        </p:spPr>
+        <p:txBody>
+          <a:bodyPr wrap="square" tIns="36000" bIns="36000" rtlCol="0" anchor="ctr">
+            <a:noAutofit/>
+          </a:bodyPr>
+          <a:lstStyle/>
+          <a:p>
+            <a:pPr algn="ctr" defTabSz="914377"/>
+            <a:r>
+              <a:rPr lang="en-US" sz="1100" b="1" kern="0">
+                <a:solidFill>
+                  <a:srgbClr val="FFFFFF"/>
+                </a:solidFill>
+                <a:latin typeface="Source Sans Pro Light" charset="0"/>
+                <a:ea typeface="Source Sans Pro Light" charset="0"/>
+              </a:rPr>
+              <a:t>The GnssManager Java object exists with default values . nothing is initialized in the natives.</a:t>
+            </a:r>
+            <a:endParaRPr lang="en-US" sz="1100" b="1" kern="0" dirty="0">
+              <a:solidFill>
+                <a:srgbClr val="FFFFFF"/>
+              </a:solidFill>
+              <a:latin typeface="Source Sans Pro Light" charset="0"/>
+              <a:ea typeface="Source Sans Pro Light" charset="0"/>
+            </a:endParaRPr>
+          </a:p>
+        </p:txBody>
+      </p:sp>
+      <p:sp>
+        <p:nvSpPr>
+          <p:cNvPr id="7" name="Rounded Rectangle 107">
+            <a:extLst>
+              <a:ext uri="{FF2B5EF4-FFF2-40B4-BE49-F238E27FC236}">
+                <a16:creationId xmlns:a16="http://schemas.microsoft.com/office/drawing/2014/main" id="{AAFD10D1-0CEB-5CF8-199C-4AB2DBF310AB}"/>
+              </a:ext>
+            </a:extLst>
+          </p:cNvPr>
+          <p:cNvSpPr/>
+          <p:nvPr/>
+        </p:nvSpPr>
+        <p:spPr>
+          <a:xfrm>
+            <a:off x="1286371" y="1061009"/>
+            <a:ext cx="1503607" cy="1203417"/>
+          </a:xfrm>
+          <a:prstGeom prst="roundRect">
+            <a:avLst>
+              <a:gd name="adj" fmla="val 19644"/>
+            </a:avLst>
+          </a:prstGeom>
+          <a:solidFill>
+            <a:srgbClr val="717D83">
+              <a:lumMod val="60000"/>
+              <a:lumOff val="40000"/>
+            </a:srgbClr>
+          </a:solidFill>
+          <a:ln w="12700" cap="flat" cmpd="sng" algn="ctr">
+            <a:noFill/>
+            <a:prstDash val="solid"/>
+          </a:ln>
+          <a:effectLst/>
+        </p:spPr>
+        <p:txBody>
+          <a:bodyPr wrap="square" tIns="36000" bIns="36000" rtlCol="0" anchor="ctr">
+            <a:noAutofit/>
+          </a:bodyPr>
+          <a:lstStyle/>
+          <a:p>
+            <a:pPr algn="ctr" defTabSz="914377"/>
+            <a:r>
+              <a:rPr lang="en-US" sz="1100" b="1" kern="0" dirty="0">
+                <a:solidFill>
+                  <a:srgbClr val="FFFFFF"/>
+                </a:solidFill>
+                <a:latin typeface="Source Sans Pro Light" charset="0"/>
+                <a:ea typeface="Source Sans Pro Light" charset="0"/>
+              </a:rPr>
+              <a:t>The </a:t>
+            </a:r>
+            <a:r>
+              <a:rPr lang="en-US" sz="1100" b="1" kern="0" dirty="0" err="1">
+                <a:solidFill>
+                  <a:srgbClr val="FFFFFF"/>
+                </a:solidFill>
+                <a:latin typeface="Source Sans Pro Light" charset="0"/>
+                <a:ea typeface="Source Sans Pro Light" charset="0"/>
+              </a:rPr>
+              <a:t>GnssManager</a:t>
+            </a:r>
+            <a:r>
+              <a:rPr lang="en-US" sz="1100" b="1" kern="0" dirty="0">
+                <a:solidFill>
+                  <a:srgbClr val="FFFFFF"/>
+                </a:solidFill>
+                <a:latin typeface="Source Sans Pro Light" charset="0"/>
+                <a:ea typeface="Source Sans Pro Light" charset="0"/>
+              </a:rPr>
+              <a:t> Java object exists with default values . nothing is initialized in the natives.</a:t>
+            </a:r>
+          </a:p>
+        </p:txBody>
+      </p:sp>
+      <p:sp>
+        <p:nvSpPr>
+          <p:cNvPr id="8" name="Rounded Rectangle 107">
+            <a:extLst>
+              <a:ext uri="{FF2B5EF4-FFF2-40B4-BE49-F238E27FC236}">
+                <a16:creationId xmlns:a16="http://schemas.microsoft.com/office/drawing/2014/main" id="{00ED0228-BABA-A8F8-1688-CC1D9141281C}"/>
+              </a:ext>
+            </a:extLst>
+          </p:cNvPr>
+          <p:cNvSpPr/>
+          <p:nvPr/>
+        </p:nvSpPr>
+        <p:spPr>
+          <a:xfrm>
+            <a:off x="4465230" y="1047254"/>
+            <a:ext cx="1450747" cy="1228541"/>
+          </a:xfrm>
+          <a:prstGeom prst="roundRect">
+            <a:avLst>
+              <a:gd name="adj" fmla="val 19644"/>
+            </a:avLst>
+          </a:prstGeom>
+          <a:solidFill>
+            <a:srgbClr val="717D83">
+              <a:lumMod val="60000"/>
+              <a:lumOff val="40000"/>
+            </a:srgbClr>
+          </a:solidFill>
+          <a:ln w="12700" cap="flat" cmpd="sng" algn="ctr">
+            <a:noFill/>
+            <a:prstDash val="solid"/>
+          </a:ln>
+          <a:effectLst/>
+        </p:spPr>
+        <p:txBody>
+          <a:bodyPr wrap="square" tIns="36000" bIns="36000" rtlCol="0" anchor="ctr">
+            <a:noAutofit/>
+          </a:bodyPr>
+          <a:lstStyle/>
+          <a:p>
+            <a:pPr algn="ctr" defTabSz="914377"/>
+            <a:r>
+              <a:rPr lang="en-US" sz="1100" b="1" kern="0" dirty="0">
+                <a:solidFill>
+                  <a:srgbClr val="FFFFFF"/>
+                </a:solidFill>
+                <a:latin typeface="Source Sans Pro Light" charset="0"/>
+                <a:ea typeface="Source Sans Pro Light" charset="0"/>
+              </a:rPr>
+              <a:t>Natives are initialized. Stopped state indicate the engine was started once and old data can be retrieved.</a:t>
+            </a:r>
+          </a:p>
+        </p:txBody>
+      </p:sp>
+      <p:sp>
+        <p:nvSpPr>
+          <p:cNvPr id="2" name="Rounded Rectangle 107">
+            <a:extLst>
+              <a:ext uri="{FF2B5EF4-FFF2-40B4-BE49-F238E27FC236}">
+                <a16:creationId xmlns:a16="http://schemas.microsoft.com/office/drawing/2014/main" id="{CB1715CB-E6CB-1C3D-F41C-C61E846958AB}"/>
+              </a:ext>
+            </a:extLst>
+          </p:cNvPr>
+          <p:cNvSpPr/>
+          <p:nvPr/>
+        </p:nvSpPr>
+        <p:spPr>
+          <a:xfrm>
+            <a:off x="4465229" y="2359513"/>
+            <a:ext cx="1450077" cy="615464"/>
           </a:xfrm>
           <a:prstGeom prst="roundRect">
             <a:avLst>
@@ -3763,10 +4189,10 @@
       </p:sp>
       <p:sp>
         <p:nvSpPr>
-          <p:cNvPr id="44" name="TextBox 43">
-            <a:extLst>
-              <a:ext uri="{FF2B5EF4-FFF2-40B4-BE49-F238E27FC236}">
-                <a16:creationId xmlns:a16="http://schemas.microsoft.com/office/drawing/2014/main" id="{C7A6034C-003C-4930-B5EB-FC1891D4AA4A}"/>
+          <p:cNvPr id="6" name="TextBox 5">
+            <a:extLst>
+              <a:ext uri="{FF2B5EF4-FFF2-40B4-BE49-F238E27FC236}">
+                <a16:creationId xmlns:a16="http://schemas.microsoft.com/office/drawing/2014/main" id="{231CA963-AA7F-4824-D438-218598FAA982}"/>
               </a:ext>
             </a:extLst>
           </p:cNvPr>
@@ -3775,7 +4201,7 @@
         </p:nvSpPr>
         <p:spPr>
           <a:xfrm>
-            <a:off x="6330289" y="3848838"/>
+            <a:off x="6325246" y="2413329"/>
             <a:ext cx="855203" cy="253916"/>
           </a:xfrm>
           <a:prstGeom prst="rect">
@@ -3847,23 +4273,23 @@
       </p:sp>
       <p:cxnSp>
         <p:nvCxnSpPr>
-          <p:cNvPr id="30" name="Straight Arrow Connector 29">
-            <a:extLst>
-              <a:ext uri="{FF2B5EF4-FFF2-40B4-BE49-F238E27FC236}">
-                <a16:creationId xmlns:a16="http://schemas.microsoft.com/office/drawing/2014/main" id="{DB52D271-5CBD-948F-F8AA-21CB46D58074}"/>
+          <p:cNvPr id="9" name="Straight Arrow Connector 8">
+            <a:extLst>
+              <a:ext uri="{FF2B5EF4-FFF2-40B4-BE49-F238E27FC236}">
+                <a16:creationId xmlns:a16="http://schemas.microsoft.com/office/drawing/2014/main" id="{B94EC208-F5D6-0CCD-1C22-25243F8EBBFC}"/>
               </a:ext>
             </a:extLst>
           </p:cNvPr>
           <p:cNvCxnSpPr>
             <a:cxnSpLocks/>
-            <a:stCxn id="60" idx="1"/>
+            <a:stCxn id="2" idx="3"/>
           </p:cNvCxnSpPr>
           <p:nvPr/>
         </p:nvCxnSpPr>
         <p:spPr>
-          <a:xfrm flipH="1" flipV="1">
-            <a:off x="2789854" y="2668400"/>
-            <a:ext cx="1675376" cy="2344"/>
+          <a:xfrm>
+            <a:off x="5915306" y="2667245"/>
+            <a:ext cx="1643254" cy="0"/>
           </a:xfrm>
           <a:prstGeom prst="straightConnector1">
             <a:avLst/>
@@ -3890,87 +4316,31 @@
           </a:fontRef>
         </p:style>
       </p:cxnSp>
-      <p:cxnSp>
-        <p:nvCxnSpPr>
-          <p:cNvPr id="31" name="Straight Arrow Connector 30">
-            <a:extLst>
-              <a:ext uri="{FF2B5EF4-FFF2-40B4-BE49-F238E27FC236}">
-                <a16:creationId xmlns:a16="http://schemas.microsoft.com/office/drawing/2014/main" id="{1E3A1595-4B16-5346-5F01-071A98242A54}"/>
-              </a:ext>
-            </a:extLst>
-          </p:cNvPr>
-          <p:cNvCxnSpPr>
-            <a:cxnSpLocks/>
-            <a:stCxn id="33" idx="3"/>
-          </p:cNvCxnSpPr>
+      <p:sp>
+        <p:nvSpPr>
+          <p:cNvPr id="10" name="TextBox 9">
+            <a:extLst>
+              <a:ext uri="{FF2B5EF4-FFF2-40B4-BE49-F238E27FC236}">
+                <a16:creationId xmlns:a16="http://schemas.microsoft.com/office/drawing/2014/main" id="{F0964E69-536B-FFD3-F17E-F70E255AE505}"/>
+              </a:ext>
+            </a:extLst>
+          </p:cNvPr>
+          <p:cNvSpPr txBox="1"/>
           <p:nvPr/>
-        </p:nvCxnSpPr>
+        </p:nvSpPr>
         <p:spPr>
           <a:xfrm>
-            <a:off x="5944784" y="4102754"/>
-            <a:ext cx="1618819" cy="0"/>
+            <a:off x="3011163" y="2721061"/>
+            <a:ext cx="1231103" cy="253916"/>
           </a:xfrm>
-          <a:prstGeom prst="straightConnector1">
+          <a:prstGeom prst="rect">
             <a:avLst/>
           </a:prstGeom>
-          <a:ln w="28575">
-            <a:solidFill>
-              <a:srgbClr val="A9B1B5"/>
-            </a:solidFill>
-            <a:tailEnd type="triangle"/>
-          </a:ln>
+          <a:noFill/>
         </p:spPr>
-        <p:style>
-          <a:lnRef idx="1">
-            <a:schemeClr val="accent1"/>
-          </a:lnRef>
-          <a:fillRef idx="0">
-            <a:schemeClr val="accent1"/>
-          </a:fillRef>
-          <a:effectRef idx="0">
-            <a:schemeClr val="accent1"/>
-          </a:effectRef>
-          <a:fontRef idx="minor">
-            <a:schemeClr val="tx1"/>
-          </a:fontRef>
-        </p:style>
-      </p:cxnSp>
-      <p:sp>
-        <p:nvSpPr>
-          <p:cNvPr id="60" name="Rounded Rectangle 107">
-            <a:extLst>
-              <a:ext uri="{FF2B5EF4-FFF2-40B4-BE49-F238E27FC236}">
-                <a16:creationId xmlns:a16="http://schemas.microsoft.com/office/drawing/2014/main" id="{73F4CE58-8D73-0628-A669-364010409A44}"/>
-              </a:ext>
-            </a:extLst>
-          </p:cNvPr>
-          <p:cNvSpPr/>
-          <p:nvPr/>
-        </p:nvSpPr>
-        <p:spPr>
-          <a:xfrm>
-            <a:off x="4465230" y="2363012"/>
-            <a:ext cx="1455510" cy="615464"/>
-          </a:xfrm>
-          <a:prstGeom prst="roundRect">
-            <a:avLst>
-              <a:gd name="adj" fmla="val 19644"/>
-            </a:avLst>
-          </a:prstGeom>
-          <a:solidFill>
-            <a:srgbClr val="CBD3D7">
-              <a:lumMod val="50000"/>
-            </a:srgbClr>
-          </a:solidFill>
-          <a:ln w="12700" cap="flat" cmpd="sng" algn="ctr">
-            <a:noFill/>
-            <a:prstDash val="solid"/>
-          </a:ln>
-          <a:effectLst/>
-        </p:spPr>
-        <p:txBody>
-          <a:bodyPr wrap="square" tIns="36000" bIns="36000" rtlCol="0" anchor="ctr">
-            <a:noAutofit/>
+        <p:txBody>
+          <a:bodyPr wrap="square" lIns="108000" rIns="108000" rtlCol="0">
+            <a:spAutoFit/>
           </a:bodyPr>
           <a:lstStyle/>
           <a:p>
@@ -3992,248 +4362,6 @@
               <a:defRPr/>
             </a:pPr>
             <a:r>
-              <a:rPr kumimoji="0" lang="en-US" sz="1200" b="1" u="none" strike="noStrike" kern="0" cap="none" spc="0" normalizeH="0" baseline="0" noProof="0" dirty="0">
-                <a:ln>
-                  <a:noFill/>
-                </a:ln>
-                <a:solidFill>
-                  <a:srgbClr val="FFFFFF"/>
-                </a:solidFill>
-                <a:effectLst/>
-                <a:uLnTx/>
-                <a:uFillTx/>
-                <a:latin typeface="Source Sans Pro Light" charset="0"/>
-                <a:ea typeface="Source Sans Pro Light" charset="0"/>
-                <a:cs typeface="Source Sans Pro Light" charset="0"/>
-              </a:rPr>
-              <a:t>STOPPED</a:t>
-            </a:r>
-          </a:p>
-        </p:txBody>
-      </p:sp>
-      <p:sp>
-        <p:nvSpPr>
-          <p:cNvPr id="124" name="TextBox 123">
-            <a:extLst>
-              <a:ext uri="{FF2B5EF4-FFF2-40B4-BE49-F238E27FC236}">
-                <a16:creationId xmlns:a16="http://schemas.microsoft.com/office/drawing/2014/main" id="{BC1D7D3B-2EFA-E19C-AC5C-A6E72EF5234D}"/>
-              </a:ext>
-            </a:extLst>
-          </p:cNvPr>
-          <p:cNvSpPr txBox="1"/>
-          <p:nvPr/>
-        </p:nvSpPr>
-        <p:spPr>
-          <a:xfrm>
-            <a:off x="7563604" y="670286"/>
-            <a:ext cx="1503607" cy="276999"/>
-          </a:xfrm>
-          <a:prstGeom prst="rect">
-            <a:avLst/>
-          </a:prstGeom>
-          <a:noFill/>
-        </p:spPr>
-        <p:txBody>
-          <a:bodyPr wrap="square" lIns="108000" rIns="108000" rtlCol="0">
-            <a:spAutoFit/>
-          </a:bodyPr>
-          <a:lstStyle/>
-          <a:p>
-            <a:pPr marL="0" marR="0" lvl="0" indent="0" algn="ctr" defTabSz="914377" eaLnBrk="1" fontAlgn="auto" latinLnBrk="0" hangingPunct="1">
-              <a:lnSpc>
-                <a:spcPct val="100000"/>
-              </a:lnSpc>
-              <a:spcBef>
-                <a:spcPts val="0"/>
-              </a:spcBef>
-              <a:spcAft>
-                <a:spcPts val="0"/>
-              </a:spcAft>
-              <a:buClrTx/>
-              <a:buSzTx/>
-              <a:buFontTx/>
-              <a:buNone/>
-              <a:tabLst/>
-              <a:defRPr/>
-            </a:pPr>
-            <a:r>
-              <a:rPr lang="en-US" sz="1200" b="1" kern="0" dirty="0">
-                <a:solidFill>
-                  <a:srgbClr val="4B5357"/>
-                </a:solidFill>
-                <a:latin typeface="Source Sans Pro Light" charset="0"/>
-                <a:ea typeface="Source Sans Pro Light" charset="0"/>
-                <a:cs typeface="Source Sans Pro Light" charset="0"/>
-              </a:rPr>
-              <a:t>STARTED</a:t>
-            </a:r>
-          </a:p>
-        </p:txBody>
-      </p:sp>
-      <p:sp>
-        <p:nvSpPr>
-          <p:cNvPr id="125" name="TextBox 124">
-            <a:extLst>
-              <a:ext uri="{FF2B5EF4-FFF2-40B4-BE49-F238E27FC236}">
-                <a16:creationId xmlns:a16="http://schemas.microsoft.com/office/drawing/2014/main" id="{6FFB7A3D-E784-6E77-0AB0-5ED5C5063A7B}"/>
-              </a:ext>
-            </a:extLst>
-          </p:cNvPr>
-          <p:cNvSpPr txBox="1"/>
-          <p:nvPr/>
-        </p:nvSpPr>
-        <p:spPr>
-          <a:xfrm>
-            <a:off x="4441171" y="670286"/>
-            <a:ext cx="1503613" cy="276999"/>
-          </a:xfrm>
-          <a:prstGeom prst="rect">
-            <a:avLst/>
-          </a:prstGeom>
-          <a:noFill/>
-        </p:spPr>
-        <p:txBody>
-          <a:bodyPr wrap="square" lIns="108000" rIns="108000" rtlCol="0">
-            <a:spAutoFit/>
-          </a:bodyPr>
-          <a:lstStyle/>
-          <a:p>
-            <a:pPr marL="0" marR="0" lvl="0" indent="0" algn="ctr" defTabSz="914377" eaLnBrk="1" fontAlgn="auto" latinLnBrk="0" hangingPunct="1">
-              <a:lnSpc>
-                <a:spcPct val="100000"/>
-              </a:lnSpc>
-              <a:spcBef>
-                <a:spcPts val="0"/>
-              </a:spcBef>
-              <a:spcAft>
-                <a:spcPts val="0"/>
-              </a:spcAft>
-              <a:buClrTx/>
-              <a:buSzTx/>
-              <a:buFontTx/>
-              <a:buNone/>
-              <a:tabLst/>
-              <a:defRPr/>
-            </a:pPr>
-            <a:r>
-              <a:rPr lang="en-US" sz="1200" b="1" kern="0" dirty="0">
-                <a:solidFill>
-                  <a:srgbClr val="4B5357"/>
-                </a:solidFill>
-                <a:latin typeface="Source Sans Pro Light" charset="0"/>
-                <a:ea typeface="Source Sans Pro Light" charset="0"/>
-                <a:cs typeface="Source Sans Pro Light" charset="0"/>
-              </a:rPr>
-              <a:t>INITIALIZED</a:t>
-            </a:r>
-          </a:p>
-        </p:txBody>
-      </p:sp>
-      <p:sp>
-        <p:nvSpPr>
-          <p:cNvPr id="127" name="TextBox 126">
-            <a:extLst>
-              <a:ext uri="{FF2B5EF4-FFF2-40B4-BE49-F238E27FC236}">
-                <a16:creationId xmlns:a16="http://schemas.microsoft.com/office/drawing/2014/main" id="{B7D58054-79D5-DF95-98AB-E158CB084394}"/>
-              </a:ext>
-            </a:extLst>
-          </p:cNvPr>
-          <p:cNvSpPr txBox="1"/>
-          <p:nvPr/>
-        </p:nvSpPr>
-        <p:spPr>
-          <a:xfrm>
-            <a:off x="1286373" y="670286"/>
-            <a:ext cx="1503607" cy="276999"/>
-          </a:xfrm>
-          <a:prstGeom prst="rect">
-            <a:avLst/>
-          </a:prstGeom>
-          <a:noFill/>
-        </p:spPr>
-        <p:txBody>
-          <a:bodyPr wrap="square" lIns="108000" rIns="108000" rtlCol="0">
-            <a:spAutoFit/>
-          </a:bodyPr>
-          <a:lstStyle/>
-          <a:p>
-            <a:pPr marL="0" marR="0" lvl="0" indent="0" algn="ctr" defTabSz="914377" eaLnBrk="1" fontAlgn="auto" latinLnBrk="0" hangingPunct="1">
-              <a:lnSpc>
-                <a:spcPct val="100000"/>
-              </a:lnSpc>
-              <a:spcBef>
-                <a:spcPts val="0"/>
-              </a:spcBef>
-              <a:spcAft>
-                <a:spcPts val="0"/>
-              </a:spcAft>
-              <a:buClrTx/>
-              <a:buSzTx/>
-              <a:buFontTx/>
-              <a:buNone/>
-              <a:tabLst/>
-              <a:defRPr/>
-            </a:pPr>
-            <a:r>
-              <a:rPr lang="en-US" sz="1200" b="1" kern="0" dirty="0">
-                <a:solidFill>
-                  <a:srgbClr val="4B5357"/>
-                </a:solidFill>
-                <a:latin typeface="Source Sans Pro Light" charset="0"/>
-                <a:ea typeface="Source Sans Pro Light" charset="0"/>
-                <a:cs typeface="Source Sans Pro Light" charset="0"/>
-              </a:rPr>
-              <a:t>CLOSED</a:t>
-            </a:r>
-          </a:p>
-        </p:txBody>
-      </p:sp>
-      <p:sp>
-        <p:nvSpPr>
-          <p:cNvPr id="142" name="TextBox 141">
-            <a:extLst>
-              <a:ext uri="{FF2B5EF4-FFF2-40B4-BE49-F238E27FC236}">
-                <a16:creationId xmlns:a16="http://schemas.microsoft.com/office/drawing/2014/main" id="{A9AE9E59-193C-CEDA-AC74-1370B8D763D4}"/>
-              </a:ext>
-            </a:extLst>
-          </p:cNvPr>
-          <p:cNvSpPr txBox="1"/>
-          <p:nvPr/>
-        </p:nvSpPr>
-        <p:spPr>
-          <a:xfrm>
-            <a:off x="6322922" y="2359699"/>
-            <a:ext cx="855203" cy="253916"/>
-          </a:xfrm>
-          <a:prstGeom prst="rect">
-            <a:avLst/>
-          </a:prstGeom>
-          <a:noFill/>
-        </p:spPr>
-        <p:txBody>
-          <a:bodyPr wrap="square" lIns="108000" rIns="108000" rtlCol="0">
-            <a:spAutoFit/>
-          </a:bodyPr>
-          <a:lstStyle/>
-          <a:p>
-            <a:pPr marL="0" marR="0" lvl="0" indent="0" algn="ctr" defTabSz="914377" eaLnBrk="1" fontAlgn="auto" latinLnBrk="0" hangingPunct="1">
-              <a:lnSpc>
-                <a:spcPct val="100000"/>
-              </a:lnSpc>
-              <a:spcBef>
-                <a:spcPts val="0"/>
-              </a:spcBef>
-              <a:spcAft>
-                <a:spcPts val="0"/>
-              </a:spcAft>
-              <a:buClrTx/>
-              <a:buSzTx/>
-              <a:buFontTx/>
-              <a:buNone/>
-              <a:tabLst/>
-              <a:defRPr/>
-            </a:pPr>
-            <a:r>
               <a:rPr lang="en-US" sz="1050" b="1" kern="0" dirty="0" err="1">
                 <a:solidFill>
                   <a:srgbClr val="4B5357"/>
@@ -4242,7 +4370,7 @@
                 <a:ea typeface="Source Sans Pro Light" charset="0"/>
                 <a:cs typeface="Source Sans Pro Light" charset="0"/>
               </a:rPr>
-              <a:t>switchON</a:t>
+              <a:t>closeManager</a:t>
             </a:r>
             <a:r>
               <a:rPr lang="en-US" sz="1050" b="1" kern="0" dirty="0">
@@ -4274,10 +4402,10 @@
       </p:sp>
       <p:sp>
         <p:nvSpPr>
-          <p:cNvPr id="143" name="TextBox 142">
-            <a:extLst>
-              <a:ext uri="{FF2B5EF4-FFF2-40B4-BE49-F238E27FC236}">
-                <a16:creationId xmlns:a16="http://schemas.microsoft.com/office/drawing/2014/main" id="{05BA9C05-0744-CB84-3CEF-B6DC619DF762}"/>
+          <p:cNvPr id="12" name="TextBox 11">
+            <a:extLst>
+              <a:ext uri="{FF2B5EF4-FFF2-40B4-BE49-F238E27FC236}">
+                <a16:creationId xmlns:a16="http://schemas.microsoft.com/office/drawing/2014/main" id="{28F867F4-A140-2E4D-9A91-33E49A380A96}"/>
               </a:ext>
             </a:extLst>
           </p:cNvPr>
@@ -4286,8 +4414,8 @@
         </p:nvSpPr>
         <p:spPr>
           <a:xfrm>
-            <a:off x="6330289" y="2725425"/>
-            <a:ext cx="855203" cy="253916"/>
+            <a:off x="2958671" y="2354156"/>
+            <a:ext cx="1336088" cy="253916"/>
           </a:xfrm>
           <a:prstGeom prst="rect">
             <a:avLst/>
@@ -4326,7 +4454,7 @@
                 <a:ea typeface="Source Sans Pro Light" charset="0"/>
                 <a:cs typeface="Source Sans Pro Light" charset="0"/>
               </a:rPr>
-              <a:t>switchOFF</a:t>
+              <a:t>initializeManager</a:t>
             </a:r>
             <a:r>
               <a:rPr lang="en-US" sz="1050" b="1" kern="0" dirty="0">
@@ -4356,264 +4484,12 @@
           </a:p>
         </p:txBody>
       </p:sp>
-      <p:sp>
-        <p:nvSpPr>
-          <p:cNvPr id="145" name="TextBox 144">
-            <a:extLst>
-              <a:ext uri="{FF2B5EF4-FFF2-40B4-BE49-F238E27FC236}">
-                <a16:creationId xmlns:a16="http://schemas.microsoft.com/office/drawing/2014/main" id="{70022FD0-265C-9674-CCF4-C28B443DCE08}"/>
-              </a:ext>
-            </a:extLst>
-          </p:cNvPr>
-          <p:cNvSpPr txBox="1"/>
-          <p:nvPr/>
-        </p:nvSpPr>
-        <p:spPr>
-          <a:xfrm>
-            <a:off x="3016206" y="4156570"/>
-            <a:ext cx="1231103" cy="253916"/>
-          </a:xfrm>
-          <a:prstGeom prst="rect">
-            <a:avLst/>
-          </a:prstGeom>
-          <a:noFill/>
-        </p:spPr>
-        <p:txBody>
-          <a:bodyPr wrap="square" lIns="108000" rIns="108000" rtlCol="0">
-            <a:spAutoFit/>
-          </a:bodyPr>
-          <a:lstStyle/>
-          <a:p>
-            <a:pPr marL="0" marR="0" lvl="0" indent="0" algn="ctr" defTabSz="914377" eaLnBrk="1" fontAlgn="auto" latinLnBrk="0" hangingPunct="1">
-              <a:lnSpc>
-                <a:spcPct val="100000"/>
-              </a:lnSpc>
-              <a:spcBef>
-                <a:spcPts val="0"/>
-              </a:spcBef>
-              <a:spcAft>
-                <a:spcPts val="0"/>
-              </a:spcAft>
-              <a:buClrTx/>
-              <a:buSzTx/>
-              <a:buFontTx/>
-              <a:buNone/>
-              <a:tabLst/>
-              <a:defRPr/>
-            </a:pPr>
-            <a:r>
-              <a:rPr lang="en-US" sz="1050" b="1" kern="0" dirty="0" err="1">
-                <a:solidFill>
-                  <a:srgbClr val="4B5357"/>
-                </a:solidFill>
-                <a:latin typeface="Source Sans Pro Light" charset="0"/>
-                <a:ea typeface="Source Sans Pro Light" charset="0"/>
-                <a:cs typeface="Source Sans Pro Light" charset="0"/>
-              </a:rPr>
-              <a:t>initializeManager</a:t>
-            </a:r>
-            <a:r>
-              <a:rPr lang="en-US" sz="1050" b="1" kern="0" dirty="0">
-                <a:solidFill>
-                  <a:srgbClr val="4B5357"/>
-                </a:solidFill>
-                <a:latin typeface="Source Sans Pro Light" charset="0"/>
-                <a:ea typeface="Source Sans Pro Light" charset="0"/>
-                <a:cs typeface="Source Sans Pro Light" charset="0"/>
-              </a:rPr>
-              <a:t>()</a:t>
-            </a:r>
-            <a:endParaRPr kumimoji="0" lang="en-US" sz="1050" b="1" i="0" u="none" strike="noStrike" kern="0" cap="none" spc="0" normalizeH="0" baseline="0" noProof="0" dirty="0">
-              <a:ln>
-                <a:noFill/>
-              </a:ln>
-              <a:solidFill>
-                <a:srgbClr val="4B5357"/>
-              </a:solidFill>
-              <a:effectLst/>
-              <a:uLnTx/>
-              <a:uFillTx/>
-              <a:latin typeface="Source Sans Pro Light" charset="0"/>
-              <a:ea typeface="Source Sans Pro Light" charset="0"/>
-              <a:cs typeface="Source Sans Pro Light" charset="0"/>
-            </a:endParaRPr>
-          </a:p>
-        </p:txBody>
-      </p:sp>
-      <p:sp>
-        <p:nvSpPr>
-          <p:cNvPr id="146" name="TextBox 145">
-            <a:extLst>
-              <a:ext uri="{FF2B5EF4-FFF2-40B4-BE49-F238E27FC236}">
-                <a16:creationId xmlns:a16="http://schemas.microsoft.com/office/drawing/2014/main" id="{D49FDF77-4D8A-3F59-5488-59B6E0397306}"/>
-              </a:ext>
-            </a:extLst>
-          </p:cNvPr>
-          <p:cNvSpPr txBox="1"/>
-          <p:nvPr/>
-        </p:nvSpPr>
-        <p:spPr>
-          <a:xfrm>
-            <a:off x="3057740" y="3789665"/>
-            <a:ext cx="1148035" cy="253916"/>
-          </a:xfrm>
-          <a:prstGeom prst="rect">
-            <a:avLst/>
-          </a:prstGeom>
-          <a:noFill/>
-        </p:spPr>
-        <p:txBody>
-          <a:bodyPr wrap="square" lIns="108000" rIns="108000" rtlCol="0">
-            <a:spAutoFit/>
-          </a:bodyPr>
-          <a:lstStyle/>
-          <a:p>
-            <a:pPr marL="0" marR="0" lvl="0" indent="0" algn="ctr" defTabSz="914377" eaLnBrk="1" fontAlgn="auto" latinLnBrk="0" hangingPunct="1">
-              <a:lnSpc>
-                <a:spcPct val="100000"/>
-              </a:lnSpc>
-              <a:spcBef>
-                <a:spcPts val="0"/>
-              </a:spcBef>
-              <a:spcAft>
-                <a:spcPts val="0"/>
-              </a:spcAft>
-              <a:buClrTx/>
-              <a:buSzTx/>
-              <a:buFontTx/>
-              <a:buNone/>
-              <a:tabLst/>
-              <a:defRPr/>
-            </a:pPr>
-            <a:r>
-              <a:rPr lang="en-US" sz="1050" b="1" kern="0" dirty="0" err="1">
-                <a:solidFill>
-                  <a:srgbClr val="4B5357"/>
-                </a:solidFill>
-                <a:latin typeface="Source Sans Pro Light" charset="0"/>
-                <a:ea typeface="Source Sans Pro Light" charset="0"/>
-                <a:cs typeface="Source Sans Pro Light" charset="0"/>
-              </a:rPr>
-              <a:t>closeManager</a:t>
-            </a:r>
-            <a:r>
-              <a:rPr lang="en-US" sz="1050" b="1" kern="0" dirty="0">
-                <a:solidFill>
-                  <a:srgbClr val="4B5357"/>
-                </a:solidFill>
-                <a:latin typeface="Source Sans Pro Light" charset="0"/>
-                <a:ea typeface="Source Sans Pro Light" charset="0"/>
-                <a:cs typeface="Source Sans Pro Light" charset="0"/>
-              </a:rPr>
-              <a:t>()</a:t>
-            </a:r>
-            <a:endParaRPr kumimoji="0" lang="en-US" sz="1050" b="1" i="0" u="none" strike="noStrike" kern="0" cap="none" spc="0" normalizeH="0" baseline="0" noProof="0" dirty="0">
-              <a:ln>
-                <a:noFill/>
-              </a:ln>
-              <a:solidFill>
-                <a:srgbClr val="4B5357"/>
-              </a:solidFill>
-              <a:effectLst/>
-              <a:uLnTx/>
-              <a:uFillTx/>
-              <a:latin typeface="Source Sans Pro Light" charset="0"/>
-              <a:ea typeface="Source Sans Pro Light" charset="0"/>
-              <a:cs typeface="Source Sans Pro Light" charset="0"/>
-            </a:endParaRPr>
-          </a:p>
-        </p:txBody>
-      </p:sp>
-      <p:sp>
-        <p:nvSpPr>
-          <p:cNvPr id="147" name="TextBox 146">
-            <a:extLst>
-              <a:ext uri="{FF2B5EF4-FFF2-40B4-BE49-F238E27FC236}">
-                <a16:creationId xmlns:a16="http://schemas.microsoft.com/office/drawing/2014/main" id="{0A1477C5-CFF4-3627-F86C-C443C8335DD7}"/>
-              </a:ext>
-            </a:extLst>
-          </p:cNvPr>
-          <p:cNvSpPr txBox="1"/>
-          <p:nvPr/>
-        </p:nvSpPr>
-        <p:spPr>
-          <a:xfrm>
-            <a:off x="3100095" y="2687105"/>
-            <a:ext cx="1063323" cy="253916"/>
-          </a:xfrm>
-          <a:prstGeom prst="rect">
-            <a:avLst/>
-          </a:prstGeom>
-          <a:noFill/>
-        </p:spPr>
-        <p:txBody>
-          <a:bodyPr wrap="square" lIns="108000" rIns="108000" rtlCol="0">
-            <a:spAutoFit/>
-          </a:bodyPr>
-          <a:lstStyle/>
-          <a:p>
-            <a:pPr marL="0" marR="0" lvl="0" indent="0" algn="ctr" defTabSz="914377" eaLnBrk="1" fontAlgn="auto" latinLnBrk="0" hangingPunct="1">
-              <a:lnSpc>
-                <a:spcPct val="100000"/>
-              </a:lnSpc>
-              <a:spcBef>
-                <a:spcPts val="0"/>
-              </a:spcBef>
-              <a:spcAft>
-                <a:spcPts val="0"/>
-              </a:spcAft>
-              <a:buClrTx/>
-              <a:buSzTx/>
-              <a:buFontTx/>
-              <a:buNone/>
-              <a:tabLst/>
-              <a:defRPr/>
-            </a:pPr>
-            <a:r>
-              <a:rPr lang="en-US" sz="1050" b="1" kern="0" dirty="0" err="1">
-                <a:solidFill>
-                  <a:srgbClr val="4B5357"/>
-                </a:solidFill>
-                <a:latin typeface="Source Sans Pro Light" charset="0"/>
-                <a:ea typeface="Source Sans Pro Light" charset="0"/>
-                <a:cs typeface="Source Sans Pro Light" charset="0"/>
-              </a:rPr>
-              <a:t>closeManager</a:t>
-            </a:r>
-            <a:r>
-              <a:rPr lang="en-US" sz="1050" b="1" kern="0" dirty="0">
-                <a:solidFill>
-                  <a:srgbClr val="4B5357"/>
-                </a:solidFill>
-                <a:latin typeface="Source Sans Pro Light" charset="0"/>
-                <a:ea typeface="Source Sans Pro Light" charset="0"/>
-                <a:cs typeface="Source Sans Pro Light" charset="0"/>
-              </a:rPr>
-              <a:t>()</a:t>
-            </a:r>
-            <a:endParaRPr kumimoji="0" lang="en-US" sz="1050" b="1" i="0" u="none" strike="noStrike" kern="0" cap="none" spc="0" normalizeH="0" baseline="0" noProof="0" dirty="0">
-              <a:ln>
-                <a:noFill/>
-              </a:ln>
-              <a:solidFill>
-                <a:srgbClr val="4B5357"/>
-              </a:solidFill>
-              <a:effectLst/>
-              <a:uLnTx/>
-              <a:uFillTx/>
-              <a:latin typeface="Source Sans Pro Light" charset="0"/>
-              <a:ea typeface="Source Sans Pro Light" charset="0"/>
-              <a:cs typeface="Source Sans Pro Light" charset="0"/>
-            </a:endParaRPr>
-          </a:p>
-        </p:txBody>
-      </p:sp>
       <p:grpSp>
         <p:nvGrpSpPr>
-          <p:cNvPr id="51" name="Group 50">
-            <a:extLst>
-              <a:ext uri="{FF2B5EF4-FFF2-40B4-BE49-F238E27FC236}">
-                <a16:creationId xmlns:a16="http://schemas.microsoft.com/office/drawing/2014/main" id="{C83382F2-F893-F1DB-897C-AA6F8AFB2F63}"/>
+          <p:cNvPr id="13" name="Group 12">
+            <a:extLst>
+              <a:ext uri="{FF2B5EF4-FFF2-40B4-BE49-F238E27FC236}">
+                <a16:creationId xmlns:a16="http://schemas.microsoft.com/office/drawing/2014/main" id="{0AFE984B-4933-528B-9296-7780AF168F42}"/>
               </a:ext>
             </a:extLst>
           </p:cNvPr>
@@ -4622,18 +4498,18 @@
         </p:nvGrpSpPr>
         <p:grpSpPr>
           <a:xfrm>
-            <a:off x="5915183" y="2635034"/>
-            <a:ext cx="1647626" cy="80935"/>
+            <a:off x="2789977" y="2626777"/>
+            <a:ext cx="1675251" cy="80935"/>
             <a:chOff x="2783425" y="4358082"/>
             <a:chExt cx="2046017" cy="84902"/>
           </a:xfrm>
         </p:grpSpPr>
         <p:cxnSp>
           <p:nvCxnSpPr>
-            <p:cNvPr id="52" name="Straight Arrow Connector 51">
+            <p:cNvPr id="14" name="Straight Arrow Connector 13">
               <a:extLst>
                 <a:ext uri="{FF2B5EF4-FFF2-40B4-BE49-F238E27FC236}">
-                  <a16:creationId xmlns:a16="http://schemas.microsoft.com/office/drawing/2014/main" id="{CE9DD7D0-3EAA-51BF-8909-455EDABF5AD2}"/>
+                  <a16:creationId xmlns:a16="http://schemas.microsoft.com/office/drawing/2014/main" id="{28DB59A5-3385-73ED-5C3E-BB0F415C7BEB}"/>
                 </a:ext>
               </a:extLst>
             </p:cNvPr>
@@ -4674,10 +4550,10 @@
         </p:cxnSp>
         <p:cxnSp>
           <p:nvCxnSpPr>
-            <p:cNvPr id="53" name="Straight Arrow Connector 52">
+            <p:cNvPr id="15" name="Straight Arrow Connector 14">
               <a:extLst>
                 <a:ext uri="{FF2B5EF4-FFF2-40B4-BE49-F238E27FC236}">
-                  <a16:creationId xmlns:a16="http://schemas.microsoft.com/office/drawing/2014/main" id="{8DC321F6-5D69-E792-8E24-67CB144C4EB5}"/>
+                  <a16:creationId xmlns:a16="http://schemas.microsoft.com/office/drawing/2014/main" id="{A5FD47BB-040E-0929-1911-5F79A556ED46}"/>
                 </a:ext>
               </a:extLst>
             </p:cNvPr>
@@ -4717,12 +4593,57 @@
           </p:style>
         </p:cxnSp>
       </p:grpSp>
-      <p:sp>
-        <p:nvSpPr>
-          <p:cNvPr id="3" name="Rounded Rectangle 107">
-            <a:extLst>
-              <a:ext uri="{FF2B5EF4-FFF2-40B4-BE49-F238E27FC236}">
-                <a16:creationId xmlns:a16="http://schemas.microsoft.com/office/drawing/2014/main" id="{C7F85A4A-6ABB-B5F6-C888-953C342BF858}"/>
+      <p:cxnSp>
+        <p:nvCxnSpPr>
+          <p:cNvPr id="20" name="Straight Arrow Connector 19">
+            <a:extLst>
+              <a:ext uri="{FF2B5EF4-FFF2-40B4-BE49-F238E27FC236}">
+                <a16:creationId xmlns:a16="http://schemas.microsoft.com/office/drawing/2014/main" id="{FC8F9512-26FF-12DA-87BB-76CC9D5B949D}"/>
+              </a:ext>
+            </a:extLst>
+          </p:cNvPr>
+          <p:cNvCxnSpPr>
+            <a:cxnSpLocks/>
+            <a:stCxn id="23" idx="1"/>
+          </p:cNvCxnSpPr>
+          <p:nvPr/>
+        </p:nvCxnSpPr>
+        <p:spPr>
+          <a:xfrm flipH="1" flipV="1">
+            <a:off x="2789978" y="4090409"/>
+            <a:ext cx="1682567" cy="2344"/>
+          </a:xfrm>
+          <a:prstGeom prst="straightConnector1">
+            <a:avLst/>
+          </a:prstGeom>
+          <a:ln w="28575">
+            <a:solidFill>
+              <a:srgbClr val="A9B1B5"/>
+            </a:solidFill>
+            <a:tailEnd type="triangle"/>
+          </a:ln>
+        </p:spPr>
+        <p:style>
+          <a:lnRef idx="1">
+            <a:schemeClr val="accent1"/>
+          </a:lnRef>
+          <a:fillRef idx="0">
+            <a:schemeClr val="accent1"/>
+          </a:fillRef>
+          <a:effectRef idx="0">
+            <a:schemeClr val="accent1"/>
+          </a:effectRef>
+          <a:fontRef idx="minor">
+            <a:schemeClr val="tx1"/>
+          </a:fontRef>
+        </p:style>
+      </p:cxnSp>
+      <p:sp>
+        <p:nvSpPr>
+          <p:cNvPr id="23" name="Rounded Rectangle 107">
+            <a:extLst>
+              <a:ext uri="{FF2B5EF4-FFF2-40B4-BE49-F238E27FC236}">
+                <a16:creationId xmlns:a16="http://schemas.microsoft.com/office/drawing/2014/main" id="{B828122A-A7B9-2B24-52D5-FD67792382AD}"/>
               </a:ext>
             </a:extLst>
           </p:cNvPr>
@@ -4731,8 +4652,8 @@
         </p:nvSpPr>
         <p:spPr>
           <a:xfrm>
-            <a:off x="7563603" y="1052945"/>
-            <a:ext cx="1503607" cy="1207783"/>
+            <a:off x="4472545" y="3785021"/>
+            <a:ext cx="1441128" cy="615464"/>
           </a:xfrm>
           <a:prstGeom prst="roundRect">
             <a:avLst>
@@ -4740,9 +4661,8 @@
             </a:avLst>
           </a:prstGeom>
           <a:solidFill>
-            <a:srgbClr val="717D83">
-              <a:lumMod val="60000"/>
-              <a:lumOff val="40000"/>
+            <a:srgbClr val="CBD3D7">
+              <a:lumMod val="50000"/>
             </a:srgbClr>
           </a:solidFill>
           <a:ln w="12700" cap="flat" cmpd="sng" algn="ctr">
@@ -4757,215 +4677,301 @@
           </a:bodyPr>
           <a:lstStyle/>
           <a:p>
-            <a:pPr algn="ctr" defTabSz="914377"/>
-            <a:r>
-              <a:rPr lang="en-US" sz="1100" b="1" kern="0" dirty="0">
+            <a:pPr marL="0" marR="0" lvl="0" indent="0" algn="ctr" defTabSz="914377" eaLnBrk="1" fontAlgn="auto" latinLnBrk="0" hangingPunct="1">
+              <a:lnSpc>
+                <a:spcPct val="100000"/>
+              </a:lnSpc>
+              <a:spcBef>
+                <a:spcPts val="0"/>
+              </a:spcBef>
+              <a:spcAft>
+                <a:spcPts val="0"/>
+              </a:spcAft>
+              <a:buClrTx/>
+              <a:buSzTx/>
+              <a:buFontTx/>
+              <a:buNone/>
+              <a:tabLst/>
+              <a:defRPr/>
+            </a:pPr>
+            <a:r>
+              <a:rPr kumimoji="0" lang="en-US" sz="1200" b="1" u="none" strike="noStrike" kern="0" cap="none" spc="0" normalizeH="0" baseline="0" noProof="0" dirty="0">
+                <a:ln>
+                  <a:noFill/>
+                </a:ln>
                 <a:solidFill>
                   <a:srgbClr val="FFFFFF"/>
                 </a:solidFill>
+                <a:effectLst/>
+                <a:uLnTx/>
+                <a:uFillTx/>
                 <a:latin typeface="Source Sans Pro Light" charset="0"/>
                 <a:ea typeface="Source Sans Pro Light" charset="0"/>
+                <a:cs typeface="Source Sans Pro Light" charset="0"/>
               </a:rPr>
-              <a:t>Underlying GNSS engine is ON, reading of new GNSS data is possible.</a:t>
-            </a:r>
-          </a:p>
-        </p:txBody>
-      </p:sp>
-      <p:sp>
-        <p:nvSpPr>
-          <p:cNvPr id="5" name="Rounded Rectangle 107">
-            <a:extLst>
-              <a:ext uri="{FF2B5EF4-FFF2-40B4-BE49-F238E27FC236}">
-                <a16:creationId xmlns:a16="http://schemas.microsoft.com/office/drawing/2014/main" id="{6E159DF0-623D-44A9-75E0-C89A5F2C4D60}"/>
-              </a:ext>
-            </a:extLst>
-          </p:cNvPr>
-          <p:cNvSpPr/>
+              <a:t>STOPPED</a:t>
+            </a:r>
+          </a:p>
+        </p:txBody>
+      </p:sp>
+      <p:sp>
+        <p:nvSpPr>
+          <p:cNvPr id="24" name="TextBox 23">
+            <a:extLst>
+              <a:ext uri="{FF2B5EF4-FFF2-40B4-BE49-F238E27FC236}">
+                <a16:creationId xmlns:a16="http://schemas.microsoft.com/office/drawing/2014/main" id="{3B165DBE-B069-FCAB-AA77-1EC4C08A896D}"/>
+              </a:ext>
+            </a:extLst>
+          </p:cNvPr>
+          <p:cNvSpPr txBox="1"/>
           <p:nvPr/>
         </p:nvSpPr>
         <p:spPr>
           <a:xfrm>
-            <a:off x="1286373" y="1052944"/>
-            <a:ext cx="1503609" cy="1195553"/>
+            <a:off x="6323046" y="3781708"/>
+            <a:ext cx="855203" cy="253916"/>
           </a:xfrm>
-          <a:prstGeom prst="roundRect">
-            <a:avLst>
-              <a:gd name="adj" fmla="val 19644"/>
-            </a:avLst>
+          <a:prstGeom prst="rect">
+            <a:avLst/>
           </a:prstGeom>
-          <a:solidFill>
-            <a:srgbClr val="717D83">
-              <a:lumMod val="60000"/>
-              <a:lumOff val="40000"/>
-            </a:srgbClr>
-          </a:solidFill>
-          <a:ln w="12700" cap="flat" cmpd="sng" algn="ctr">
-            <a:noFill/>
-            <a:prstDash val="solid"/>
-          </a:ln>
-          <a:effectLst/>
+          <a:noFill/>
         </p:spPr>
         <p:txBody>
-          <a:bodyPr wrap="square" tIns="36000" bIns="36000" rtlCol="0" anchor="ctr">
-            <a:noAutofit/>
+          <a:bodyPr wrap="square" lIns="108000" rIns="108000" rtlCol="0">
+            <a:spAutoFit/>
           </a:bodyPr>
           <a:lstStyle/>
           <a:p>
-            <a:pPr algn="ctr" defTabSz="914377"/>
-            <a:r>
-              <a:rPr lang="en-US" sz="1100" b="1" kern="0">
+            <a:pPr marL="0" marR="0" lvl="0" indent="0" algn="ctr" defTabSz="914377" eaLnBrk="1" fontAlgn="auto" latinLnBrk="0" hangingPunct="1">
+              <a:lnSpc>
+                <a:spcPct val="100000"/>
+              </a:lnSpc>
+              <a:spcBef>
+                <a:spcPts val="0"/>
+              </a:spcBef>
+              <a:spcAft>
+                <a:spcPts val="0"/>
+              </a:spcAft>
+              <a:buClrTx/>
+              <a:buSzTx/>
+              <a:buFontTx/>
+              <a:buNone/>
+              <a:tabLst/>
+              <a:defRPr/>
+            </a:pPr>
+            <a:r>
+              <a:rPr lang="en-US" sz="1050" b="1" kern="0" dirty="0" err="1">
                 <a:solidFill>
-                  <a:srgbClr val="FFFFFF"/>
+                  <a:srgbClr val="4B5357"/>
                 </a:solidFill>
                 <a:latin typeface="Source Sans Pro Light" charset="0"/>
                 <a:ea typeface="Source Sans Pro Light" charset="0"/>
+                <a:cs typeface="Source Sans Pro Light" charset="0"/>
               </a:rPr>
-              <a:t>The GnssManager Java object exists with default values . nothing is initialized in the natives.</a:t>
-            </a:r>
-            <a:endParaRPr lang="en-US" sz="1100" b="1" kern="0" dirty="0">
-              <a:solidFill>
-                <a:srgbClr val="FFFFFF"/>
-              </a:solidFill>
-              <a:latin typeface="Source Sans Pro Light" charset="0"/>
-              <a:ea typeface="Source Sans Pro Light" charset="0"/>
-            </a:endParaRPr>
-          </a:p>
-        </p:txBody>
-      </p:sp>
-      <p:sp>
-        <p:nvSpPr>
-          <p:cNvPr id="7" name="Rounded Rectangle 107">
-            <a:extLst>
-              <a:ext uri="{FF2B5EF4-FFF2-40B4-BE49-F238E27FC236}">
-                <a16:creationId xmlns:a16="http://schemas.microsoft.com/office/drawing/2014/main" id="{3D59F491-A5F6-668B-4EE7-CE6722761AD5}"/>
-              </a:ext>
-            </a:extLst>
-          </p:cNvPr>
-          <p:cNvSpPr/>
-          <p:nvPr/>
-        </p:nvSpPr>
-        <p:spPr>
-          <a:xfrm>
-            <a:off x="1286371" y="1061009"/>
-            <a:ext cx="1503607" cy="1203417"/>
-          </a:xfrm>
-          <a:prstGeom prst="roundRect">
-            <a:avLst>
-              <a:gd name="adj" fmla="val 19644"/>
-            </a:avLst>
-          </a:prstGeom>
-          <a:solidFill>
-            <a:srgbClr val="717D83">
-              <a:lumMod val="60000"/>
-              <a:lumOff val="40000"/>
-            </a:srgbClr>
-          </a:solidFill>
-          <a:ln w="12700" cap="flat" cmpd="sng" algn="ctr">
-            <a:noFill/>
-            <a:prstDash val="solid"/>
-          </a:ln>
-          <a:effectLst/>
-        </p:spPr>
-        <p:txBody>
-          <a:bodyPr wrap="square" tIns="36000" bIns="36000" rtlCol="0" anchor="ctr">
-            <a:noAutofit/>
-          </a:bodyPr>
-          <a:lstStyle/>
-          <a:p>
-            <a:pPr algn="ctr" defTabSz="914377"/>
-            <a:r>
-              <a:rPr lang="en-US" sz="1100" b="1" kern="0" dirty="0">
+              <a:t>switchON</a:t>
+            </a:r>
+            <a:r>
+              <a:rPr lang="en-US" sz="1050" b="1" kern="0" dirty="0">
                 <a:solidFill>
-                  <a:srgbClr val="FFFFFF"/>
+                  <a:srgbClr val="4B5357"/>
                 </a:solidFill>
                 <a:latin typeface="Source Sans Pro Light" charset="0"/>
                 <a:ea typeface="Source Sans Pro Light" charset="0"/>
+                <a:cs typeface="Source Sans Pro Light" charset="0"/>
               </a:rPr>
-              <a:t>The </a:t>
-            </a:r>
-            <a:r>
-              <a:rPr lang="en-US" sz="1100" b="1" kern="0" dirty="0" err="1">
+              <a:t>()</a:t>
+            </a:r>
+            <a:endParaRPr kumimoji="0" lang="en-US" sz="1050" b="1" i="0" u="none" strike="noStrike" kern="0" cap="none" spc="0" normalizeH="0" baseline="0" noProof="0" dirty="0">
+              <a:ln>
+                <a:noFill/>
+              </a:ln>
+              <a:solidFill>
+                <a:srgbClr val="4B5357"/>
+              </a:solidFill>
+              <a:effectLst/>
+              <a:uLnTx/>
+              <a:uFillTx/>
+              <a:latin typeface="Source Sans Pro Light" charset="0"/>
+              <a:ea typeface="Source Sans Pro Light" charset="0"/>
+              <a:cs typeface="Source Sans Pro Light" charset="0"/>
+            </a:endParaRPr>
+          </a:p>
+        </p:txBody>
+      </p:sp>
+      <p:sp>
+        <p:nvSpPr>
+          <p:cNvPr id="25" name="TextBox 24">
+            <a:extLst>
+              <a:ext uri="{FF2B5EF4-FFF2-40B4-BE49-F238E27FC236}">
+                <a16:creationId xmlns:a16="http://schemas.microsoft.com/office/drawing/2014/main" id="{4FAACD9B-31C8-BCB6-BE45-01D55E945C10}"/>
+              </a:ext>
+            </a:extLst>
+          </p:cNvPr>
+          <p:cNvSpPr txBox="1"/>
+          <p:nvPr/>
+        </p:nvSpPr>
+        <p:spPr>
+          <a:xfrm>
+            <a:off x="6330413" y="4147434"/>
+            <a:ext cx="855203" cy="253916"/>
+          </a:xfrm>
+          <a:prstGeom prst="rect">
+            <a:avLst/>
+          </a:prstGeom>
+          <a:noFill/>
+        </p:spPr>
+        <p:txBody>
+          <a:bodyPr wrap="square" lIns="108000" rIns="108000" rtlCol="0">
+            <a:spAutoFit/>
+          </a:bodyPr>
+          <a:lstStyle/>
+          <a:p>
+            <a:pPr marL="0" marR="0" lvl="0" indent="0" algn="ctr" defTabSz="914377" eaLnBrk="1" fontAlgn="auto" latinLnBrk="0" hangingPunct="1">
+              <a:lnSpc>
+                <a:spcPct val="100000"/>
+              </a:lnSpc>
+              <a:spcBef>
+                <a:spcPts val="0"/>
+              </a:spcBef>
+              <a:spcAft>
+                <a:spcPts val="0"/>
+              </a:spcAft>
+              <a:buClrTx/>
+              <a:buSzTx/>
+              <a:buFontTx/>
+              <a:buNone/>
+              <a:tabLst/>
+              <a:defRPr/>
+            </a:pPr>
+            <a:r>
+              <a:rPr lang="en-US" sz="1050" b="1" kern="0" dirty="0" err="1">
                 <a:solidFill>
-                  <a:srgbClr val="FFFFFF"/>
+                  <a:srgbClr val="4B5357"/>
                 </a:solidFill>
                 <a:latin typeface="Source Sans Pro Light" charset="0"/>
                 <a:ea typeface="Source Sans Pro Light" charset="0"/>
+                <a:cs typeface="Source Sans Pro Light" charset="0"/>
               </a:rPr>
-              <a:t>GnssManager</a:t>
-            </a:r>
-            <a:r>
-              <a:rPr lang="en-US" sz="1100" b="1" kern="0" dirty="0">
+              <a:t>switchOFF</a:t>
+            </a:r>
+            <a:r>
+              <a:rPr lang="en-US" sz="1050" b="1" kern="0" dirty="0">
                 <a:solidFill>
-                  <a:srgbClr val="FFFFFF"/>
+                  <a:srgbClr val="4B5357"/>
                 </a:solidFill>
                 <a:latin typeface="Source Sans Pro Light" charset="0"/>
                 <a:ea typeface="Source Sans Pro Light" charset="0"/>
+                <a:cs typeface="Source Sans Pro Light" charset="0"/>
               </a:rPr>
-              <a:t> Java object exists with default values . nothing is initialized in the natives.</a:t>
-            </a:r>
-          </a:p>
-        </p:txBody>
-      </p:sp>
-      <p:sp>
-        <p:nvSpPr>
-          <p:cNvPr id="8" name="Rounded Rectangle 107">
-            <a:extLst>
-              <a:ext uri="{FF2B5EF4-FFF2-40B4-BE49-F238E27FC236}">
-                <a16:creationId xmlns:a16="http://schemas.microsoft.com/office/drawing/2014/main" id="{1B04877E-D915-F80D-A3F9-9E3CC86A466C}"/>
-              </a:ext>
-            </a:extLst>
-          </p:cNvPr>
-          <p:cNvSpPr/>
+              <a:t>()</a:t>
+            </a:r>
+            <a:endParaRPr kumimoji="0" lang="en-US" sz="1050" b="1" i="0" u="none" strike="noStrike" kern="0" cap="none" spc="0" normalizeH="0" baseline="0" noProof="0" dirty="0">
+              <a:ln>
+                <a:noFill/>
+              </a:ln>
+              <a:solidFill>
+                <a:srgbClr val="4B5357"/>
+              </a:solidFill>
+              <a:effectLst/>
+              <a:uLnTx/>
+              <a:uFillTx/>
+              <a:latin typeface="Source Sans Pro Light" charset="0"/>
+              <a:ea typeface="Source Sans Pro Light" charset="0"/>
+              <a:cs typeface="Source Sans Pro Light" charset="0"/>
+            </a:endParaRPr>
+          </a:p>
+        </p:txBody>
+      </p:sp>
+      <p:sp>
+        <p:nvSpPr>
+          <p:cNvPr id="26" name="TextBox 25">
+            <a:extLst>
+              <a:ext uri="{FF2B5EF4-FFF2-40B4-BE49-F238E27FC236}">
+                <a16:creationId xmlns:a16="http://schemas.microsoft.com/office/drawing/2014/main" id="{F1D921D2-79A9-84FD-F059-4F57DFC3C9AD}"/>
+              </a:ext>
+            </a:extLst>
+          </p:cNvPr>
+          <p:cNvSpPr txBox="1"/>
           <p:nvPr/>
         </p:nvSpPr>
         <p:spPr>
           <a:xfrm>
-            <a:off x="4465230" y="1047254"/>
-            <a:ext cx="1450747" cy="1228541"/>
+            <a:off x="3100219" y="4109114"/>
+            <a:ext cx="1063323" cy="253916"/>
           </a:xfrm>
-          <a:prstGeom prst="roundRect">
-            <a:avLst>
-              <a:gd name="adj" fmla="val 19644"/>
-            </a:avLst>
+          <a:prstGeom prst="rect">
+            <a:avLst/>
           </a:prstGeom>
-          <a:solidFill>
-            <a:srgbClr val="717D83">
-              <a:lumMod val="60000"/>
-              <a:lumOff val="40000"/>
-            </a:srgbClr>
-          </a:solidFill>
-          <a:ln w="12700" cap="flat" cmpd="sng" algn="ctr">
-            <a:noFill/>
-            <a:prstDash val="solid"/>
-          </a:ln>
-          <a:effectLst/>
+          <a:noFill/>
         </p:spPr>
         <p:txBody>
-          <a:bodyPr wrap="square" tIns="36000" bIns="36000" rtlCol="0" anchor="ctr">
-            <a:noAutofit/>
+          <a:bodyPr wrap="square" lIns="108000" rIns="108000" rtlCol="0">
+            <a:spAutoFit/>
           </a:bodyPr>
           <a:lstStyle/>
           <a:p>
-            <a:pPr algn="ctr" defTabSz="914377"/>
-            <a:r>
-              <a:rPr lang="en-US" sz="1100" b="1" kern="0" dirty="0">
+            <a:pPr marL="0" marR="0" lvl="0" indent="0" algn="ctr" defTabSz="914377" eaLnBrk="1" fontAlgn="auto" latinLnBrk="0" hangingPunct="1">
+              <a:lnSpc>
+                <a:spcPct val="100000"/>
+              </a:lnSpc>
+              <a:spcBef>
+                <a:spcPts val="0"/>
+              </a:spcBef>
+              <a:spcAft>
+                <a:spcPts val="0"/>
+              </a:spcAft>
+              <a:buClrTx/>
+              <a:buSzTx/>
+              <a:buFontTx/>
+              <a:buNone/>
+              <a:tabLst/>
+              <a:defRPr/>
+            </a:pPr>
+            <a:r>
+              <a:rPr lang="en-US" sz="1050" b="1" kern="0" dirty="0" err="1">
                 <a:solidFill>
-                  <a:srgbClr val="FFFFFF"/>
+                  <a:srgbClr val="4B5357"/>
                 </a:solidFill>
                 <a:latin typeface="Source Sans Pro Light" charset="0"/>
                 <a:ea typeface="Source Sans Pro Light" charset="0"/>
+                <a:cs typeface="Source Sans Pro Light" charset="0"/>
               </a:rPr>
-              <a:t>Natives are initialized. Stopped state indicate the engine was started once and old data can be retrieved.</a:t>
-            </a:r>
+              <a:t>closeManager</a:t>
+            </a:r>
+            <a:r>
+              <a:rPr lang="en-US" sz="1050" b="1" kern="0" dirty="0">
+                <a:solidFill>
+                  <a:srgbClr val="4B5357"/>
+                </a:solidFill>
+                <a:latin typeface="Source Sans Pro Light" charset="0"/>
+                <a:ea typeface="Source Sans Pro Light" charset="0"/>
+                <a:cs typeface="Source Sans Pro Light" charset="0"/>
+              </a:rPr>
+              <a:t>()</a:t>
+            </a:r>
+            <a:endParaRPr kumimoji="0" lang="en-US" sz="1050" b="1" i="0" u="none" strike="noStrike" kern="0" cap="none" spc="0" normalizeH="0" baseline="0" noProof="0" dirty="0">
+              <a:ln>
+                <a:noFill/>
+              </a:ln>
+              <a:solidFill>
+                <a:srgbClr val="4B5357"/>
+              </a:solidFill>
+              <a:effectLst/>
+              <a:uLnTx/>
+              <a:uFillTx/>
+              <a:latin typeface="Source Sans Pro Light" charset="0"/>
+              <a:ea typeface="Source Sans Pro Light" charset="0"/>
+              <a:cs typeface="Source Sans Pro Light" charset="0"/>
+            </a:endParaRPr>
           </a:p>
         </p:txBody>
       </p:sp>
       <p:grpSp>
         <p:nvGrpSpPr>
-          <p:cNvPr id="16" name="Group 15">
-            <a:extLst>
-              <a:ext uri="{FF2B5EF4-FFF2-40B4-BE49-F238E27FC236}">
-                <a16:creationId xmlns:a16="http://schemas.microsoft.com/office/drawing/2014/main" id="{1F82ABE3-93F3-F0E8-00F4-3BE7062E3B6B}"/>
+          <p:cNvPr id="27" name="Group 26">
+            <a:extLst>
+              <a:ext uri="{FF2B5EF4-FFF2-40B4-BE49-F238E27FC236}">
+                <a16:creationId xmlns:a16="http://schemas.microsoft.com/office/drawing/2014/main" id="{02CF6C9F-7E7A-3537-9D49-4425E37E03C8}"/>
               </a:ext>
             </a:extLst>
           </p:cNvPr>
@@ -4974,18 +4980,18 @@
         </p:nvGrpSpPr>
         <p:grpSpPr>
           <a:xfrm>
-            <a:off x="2795021" y="4062286"/>
-            <a:ext cx="1647626" cy="80935"/>
+            <a:off x="5913673" y="4057043"/>
+            <a:ext cx="1649260" cy="80935"/>
             <a:chOff x="2783425" y="4358082"/>
             <a:chExt cx="2046017" cy="84902"/>
           </a:xfrm>
         </p:grpSpPr>
         <p:cxnSp>
           <p:nvCxnSpPr>
-            <p:cNvPr id="17" name="Straight Arrow Connector 16">
+            <p:cNvPr id="28" name="Straight Arrow Connector 27">
               <a:extLst>
                 <a:ext uri="{FF2B5EF4-FFF2-40B4-BE49-F238E27FC236}">
-                  <a16:creationId xmlns:a16="http://schemas.microsoft.com/office/drawing/2014/main" id="{59A26069-F67C-8DAA-1220-2CBA28CE641D}"/>
+                  <a16:creationId xmlns:a16="http://schemas.microsoft.com/office/drawing/2014/main" id="{45C09C94-0C92-3E00-0A60-E95D53D31BDB}"/>
                 </a:ext>
               </a:extLst>
             </p:cNvPr>
@@ -5026,10 +5032,10 @@
         </p:cxnSp>
         <p:cxnSp>
           <p:nvCxnSpPr>
-            <p:cNvPr id="18" name="Straight Arrow Connector 17">
+            <p:cNvPr id="29" name="Straight Arrow Connector 28">
               <a:extLst>
                 <a:ext uri="{FF2B5EF4-FFF2-40B4-BE49-F238E27FC236}">
-                  <a16:creationId xmlns:a16="http://schemas.microsoft.com/office/drawing/2014/main" id="{C75C1C25-D3DA-50C5-0C7B-5707AB87400F}"/>
+                  <a16:creationId xmlns:a16="http://schemas.microsoft.com/office/drawing/2014/main" id="{189A23CC-3961-DBB2-4ED1-826D21865BE3}"/>
                 </a:ext>
               </a:extLst>
             </p:cNvPr>
@@ -5072,7 +5078,7 @@
     </p:spTree>
     <p:extLst>
       <p:ext uri="{BB962C8B-B14F-4D97-AF65-F5344CB8AC3E}">
-        <p14:creationId xmlns:p14="http://schemas.microsoft.com/office/powerpoint/2010/main" val="2322145634"/>
+        <p14:creationId xmlns:p14="http://schemas.microsoft.com/office/powerpoint/2010/main" val="3255386726"/>
       </p:ext>
     </p:extLst>
   </p:cSld>

</xml_diff>